<commit_message>
Menos !== true en game.js
</commit_message>
<xml_diff>
--- a/PresentacionH1/TRIBES.pptx
+++ b/PresentacionH1/TRIBES.pptx
@@ -20,6 +20,7 @@
     <p:sldId id="270" r:id="rId14"/>
     <p:sldId id="271" r:id="rId15"/>
     <p:sldId id="272" r:id="rId16"/>
+    <p:sldId id="273" r:id="rId17"/>
   </p:sldIdLst>
   <p:sldSz cx="12192000" cy="6858000"/>
   <p:notesSz cx="6858000" cy="9144000"/>
@@ -126,711 +127,6 @@
 </p:presentation>
 </file>
 
-<file path=ppt/revisionInfo.xml><?xml version="1.0" encoding="utf-8"?>
-<p1510:revInfo xmlns:a="http://schemas.openxmlformats.org/drawingml/2006/main" xmlns:r="http://schemas.openxmlformats.org/officeDocument/2006/relationships" xmlns:p1510="http://schemas.microsoft.com/office/powerpoint/2015/10/main">
-  <p1510:revLst>
-    <p1510:client id="{9D7F36AE-F77C-4854-81C3-2D749D1ACCF4}" v="38" dt="2019-10-20T15:46:22.005"/>
-  </p1510:revLst>
-</p1510:revInfo>
-</file>
-
-<file path=ppt/changesInfos/changesInfo1.xml><?xml version="1.0" encoding="utf-8"?>
-<pc:chgInfo xmlns:a="http://schemas.openxmlformats.org/drawingml/2006/main" xmlns:r="http://schemas.openxmlformats.org/officeDocument/2006/relationships" xmlns:ac="http://schemas.microsoft.com/office/drawing/2013/main/command" xmlns:pc="http://schemas.microsoft.com/office/powerpoint/2013/main/command">
-  <pc:docChgLst>
-    <pc:chgData name="Daniel González Sellán" userId="2f8bc1f2c7576c9e" providerId="LiveId" clId="{9D7F36AE-F77C-4854-81C3-2D749D1ACCF4}"/>
-    <pc:docChg chg="undo custSel mod addSld delSld modSld sldOrd">
-      <pc:chgData name="Daniel González Sellán" userId="2f8bc1f2c7576c9e" providerId="LiveId" clId="{9D7F36AE-F77C-4854-81C3-2D749D1ACCF4}" dt="2019-10-20T15:47:32.580" v="543" actId="403"/>
-      <pc:docMkLst>
-        <pc:docMk/>
-      </pc:docMkLst>
-      <pc:sldChg chg="modSp ord">
-        <pc:chgData name="Daniel González Sellán" userId="2f8bc1f2c7576c9e" providerId="LiveId" clId="{9D7F36AE-F77C-4854-81C3-2D749D1ACCF4}" dt="2019-10-20T15:47:25.967" v="537" actId="403"/>
-        <pc:sldMkLst>
-          <pc:docMk/>
-          <pc:sldMk cId="2584292214" sldId="263"/>
-        </pc:sldMkLst>
-        <pc:spChg chg="mod">
-          <ac:chgData name="Daniel González Sellán" userId="2f8bc1f2c7576c9e" providerId="LiveId" clId="{9D7F36AE-F77C-4854-81C3-2D749D1ACCF4}" dt="2019-10-20T15:47:25.967" v="537" actId="403"/>
-          <ac:spMkLst>
-            <pc:docMk/>
-            <pc:sldMk cId="2584292214" sldId="263"/>
-            <ac:spMk id="2" creationId="{4A1E4228-1475-49A0-BF73-265211E19663}"/>
-          </ac:spMkLst>
-        </pc:spChg>
-      </pc:sldChg>
-      <pc:sldChg chg="addSp delSp modSp">
-        <pc:chgData name="Daniel González Sellán" userId="2f8bc1f2c7576c9e" providerId="LiveId" clId="{9D7F36AE-F77C-4854-81C3-2D749D1ACCF4}" dt="2019-10-20T15:13:15.047" v="55" actId="1076"/>
-        <pc:sldMkLst>
-          <pc:docMk/>
-          <pc:sldMk cId="1625705604" sldId="264"/>
-        </pc:sldMkLst>
-        <pc:spChg chg="add mod">
-          <ac:chgData name="Daniel González Sellán" userId="2f8bc1f2c7576c9e" providerId="LiveId" clId="{9D7F36AE-F77C-4854-81C3-2D749D1ACCF4}" dt="2019-10-20T15:13:15.047" v="55" actId="1076"/>
-          <ac:spMkLst>
-            <pc:docMk/>
-            <pc:sldMk cId="1625705604" sldId="264"/>
-            <ac:spMk id="2" creationId="{CE1B1689-DFFF-482C-8492-AC2CA4AFE49B}"/>
-          </ac:spMkLst>
-        </pc:spChg>
-        <pc:spChg chg="del">
-          <ac:chgData name="Daniel González Sellán" userId="2f8bc1f2c7576c9e" providerId="LiveId" clId="{9D7F36AE-F77C-4854-81C3-2D749D1ACCF4}" dt="2019-10-20T15:12:07.503" v="12" actId="478"/>
-          <ac:spMkLst>
-            <pc:docMk/>
-            <pc:sldMk cId="1625705604" sldId="264"/>
-            <ac:spMk id="6" creationId="{55F2BD73-ED4D-4A91-9A7E-3FBFC2487668}"/>
-          </ac:spMkLst>
-        </pc:spChg>
-        <pc:spChg chg="del">
-          <ac:chgData name="Daniel González Sellán" userId="2f8bc1f2c7576c9e" providerId="LiveId" clId="{9D7F36AE-F77C-4854-81C3-2D749D1ACCF4}" dt="2019-10-20T15:12:12.590" v="15" actId="478"/>
-          <ac:spMkLst>
-            <pc:docMk/>
-            <pc:sldMk cId="1625705604" sldId="264"/>
-            <ac:spMk id="7" creationId="{ADDA00C0-A06C-4BC7-B43C-CAA85A1EC793}"/>
-          </ac:spMkLst>
-        </pc:spChg>
-        <pc:spChg chg="del">
-          <ac:chgData name="Daniel González Sellán" userId="2f8bc1f2c7576c9e" providerId="LiveId" clId="{9D7F36AE-F77C-4854-81C3-2D749D1ACCF4}" dt="2019-10-20T15:12:03.121" v="10" actId="478"/>
-          <ac:spMkLst>
-            <pc:docMk/>
-            <pc:sldMk cId="1625705604" sldId="264"/>
-            <ac:spMk id="8" creationId="{570F1D0A-3E6B-47D0-BEA1-84D0BFAF05D0}"/>
-          </ac:spMkLst>
-        </pc:spChg>
-        <pc:spChg chg="del">
-          <ac:chgData name="Daniel González Sellán" userId="2f8bc1f2c7576c9e" providerId="LiveId" clId="{9D7F36AE-F77C-4854-81C3-2D749D1ACCF4}" dt="2019-10-20T15:11:16.666" v="0" actId="478"/>
-          <ac:spMkLst>
-            <pc:docMk/>
-            <pc:sldMk cId="1625705604" sldId="264"/>
-            <ac:spMk id="9" creationId="{F8386B12-16E8-4A92-A16B-795E64C58B0D}"/>
-          </ac:spMkLst>
-        </pc:spChg>
-        <pc:spChg chg="add mod">
-          <ac:chgData name="Daniel González Sellán" userId="2f8bc1f2c7576c9e" providerId="LiveId" clId="{9D7F36AE-F77C-4854-81C3-2D749D1ACCF4}" dt="2019-10-20T15:12:05.414" v="11" actId="1076"/>
-          <ac:spMkLst>
-            <pc:docMk/>
-            <pc:sldMk cId="1625705604" sldId="264"/>
-            <ac:spMk id="10" creationId="{96E4DFE8-BB02-40CA-AE9E-417822E46230}"/>
-          </ac:spMkLst>
-        </pc:spChg>
-        <pc:spChg chg="add mod">
-          <ac:chgData name="Daniel González Sellán" userId="2f8bc1f2c7576c9e" providerId="LiveId" clId="{9D7F36AE-F77C-4854-81C3-2D749D1ACCF4}" dt="2019-10-20T15:12:11.202" v="14" actId="1076"/>
-          <ac:spMkLst>
-            <pc:docMk/>
-            <pc:sldMk cId="1625705604" sldId="264"/>
-            <ac:spMk id="12" creationId="{E0259996-8EE9-461F-8849-E92A6FD37319}"/>
-          </ac:spMkLst>
-        </pc:spChg>
-        <pc:spChg chg="add mod">
-          <ac:chgData name="Daniel González Sellán" userId="2f8bc1f2c7576c9e" providerId="LiveId" clId="{9D7F36AE-F77C-4854-81C3-2D749D1ACCF4}" dt="2019-10-20T15:12:15.811" v="17" actId="1076"/>
-          <ac:spMkLst>
-            <pc:docMk/>
-            <pc:sldMk cId="1625705604" sldId="264"/>
-            <ac:spMk id="13" creationId="{4AEF9B43-D850-48D7-A4A3-E4D1A17588A1}"/>
-          </ac:spMkLst>
-        </pc:spChg>
-      </pc:sldChg>
-      <pc:sldChg chg="addSp delSp modSp">
-        <pc:chgData name="Daniel González Sellán" userId="2f8bc1f2c7576c9e" providerId="LiveId" clId="{9D7F36AE-F77C-4854-81C3-2D749D1ACCF4}" dt="2019-10-20T15:12:30.662" v="27" actId="1076"/>
-        <pc:sldMkLst>
-          <pc:docMk/>
-          <pc:sldMk cId="1142510394" sldId="265"/>
-        </pc:sldMkLst>
-        <pc:spChg chg="del">
-          <ac:chgData name="Daniel González Sellán" userId="2f8bc1f2c7576c9e" providerId="LiveId" clId="{9D7F36AE-F77C-4854-81C3-2D749D1ACCF4}" dt="2019-10-20T15:12:23.638" v="22" actId="478"/>
-          <ac:spMkLst>
-            <pc:docMk/>
-            <pc:sldMk cId="1142510394" sldId="265"/>
-            <ac:spMk id="7" creationId="{ADDA00C0-A06C-4BC7-B43C-CAA85A1EC793}"/>
-          </ac:spMkLst>
-        </pc:spChg>
-        <pc:spChg chg="del">
-          <ac:chgData name="Daniel González Sellán" userId="2f8bc1f2c7576c9e" providerId="LiveId" clId="{9D7F36AE-F77C-4854-81C3-2D749D1ACCF4}" dt="2019-10-20T15:12:23.196" v="21" actId="478"/>
-          <ac:spMkLst>
-            <pc:docMk/>
-            <pc:sldMk cId="1142510394" sldId="265"/>
-            <ac:spMk id="8" creationId="{570F1D0A-3E6B-47D0-BEA1-84D0BFAF05D0}"/>
-          </ac:spMkLst>
-        </pc:spChg>
-        <pc:spChg chg="del">
-          <ac:chgData name="Daniel González Sellán" userId="2f8bc1f2c7576c9e" providerId="LiveId" clId="{9D7F36AE-F77C-4854-81C3-2D749D1ACCF4}" dt="2019-10-20T15:12:19.184" v="18" actId="478"/>
-          <ac:spMkLst>
-            <pc:docMk/>
-            <pc:sldMk cId="1142510394" sldId="265"/>
-            <ac:spMk id="9" creationId="{F8386B12-16E8-4A92-A16B-795E64C58B0D}"/>
-          </ac:spMkLst>
-        </pc:spChg>
-        <pc:spChg chg="add mod">
-          <ac:chgData name="Daniel González Sellán" userId="2f8bc1f2c7576c9e" providerId="LiveId" clId="{9D7F36AE-F77C-4854-81C3-2D749D1ACCF4}" dt="2019-10-20T15:12:30.662" v="27" actId="1076"/>
-          <ac:spMkLst>
-            <pc:docMk/>
-            <pc:sldMk cId="1142510394" sldId="265"/>
-            <ac:spMk id="10" creationId="{6492833D-9F11-4F73-8440-8926606533A7}"/>
-          </ac:spMkLst>
-        </pc:spChg>
-        <pc:spChg chg="add mod">
-          <ac:chgData name="Daniel González Sellán" userId="2f8bc1f2c7576c9e" providerId="LiveId" clId="{9D7F36AE-F77C-4854-81C3-2D749D1ACCF4}" dt="2019-10-20T15:12:26.808" v="24" actId="1076"/>
-          <ac:spMkLst>
-            <pc:docMk/>
-            <pc:sldMk cId="1142510394" sldId="265"/>
-            <ac:spMk id="13" creationId="{7B5846CD-6A3F-43BF-BCBD-FAAD831587F3}"/>
-          </ac:spMkLst>
-        </pc:spChg>
-        <pc:spChg chg="add mod">
-          <ac:chgData name="Daniel González Sellán" userId="2f8bc1f2c7576c9e" providerId="LiveId" clId="{9D7F36AE-F77C-4854-81C3-2D749D1ACCF4}" dt="2019-10-20T15:12:29.339" v="26" actId="1076"/>
-          <ac:spMkLst>
-            <pc:docMk/>
-            <pc:sldMk cId="1142510394" sldId="265"/>
-            <ac:spMk id="14" creationId="{943E8332-04B0-4058-ACF9-9F630E8286C1}"/>
-          </ac:spMkLst>
-        </pc:spChg>
-      </pc:sldChg>
-      <pc:sldChg chg="addSp delSp modSp">
-        <pc:chgData name="Daniel González Sellán" userId="2f8bc1f2c7576c9e" providerId="LiveId" clId="{9D7F36AE-F77C-4854-81C3-2D749D1ACCF4}" dt="2019-10-20T15:13:10.814" v="54" actId="1076"/>
-        <pc:sldMkLst>
-          <pc:docMk/>
-          <pc:sldMk cId="4138071570" sldId="266"/>
-        </pc:sldMkLst>
-        <pc:spChg chg="del">
-          <ac:chgData name="Daniel González Sellán" userId="2f8bc1f2c7576c9e" providerId="LiveId" clId="{9D7F36AE-F77C-4854-81C3-2D749D1ACCF4}" dt="2019-10-20T15:12:35.862" v="29" actId="478"/>
-          <ac:spMkLst>
-            <pc:docMk/>
-            <pc:sldMk cId="4138071570" sldId="266"/>
-            <ac:spMk id="6" creationId="{55F2BD73-ED4D-4A91-9A7E-3FBFC2487668}"/>
-          </ac:spMkLst>
-        </pc:spChg>
-        <pc:spChg chg="del">
-          <ac:chgData name="Daniel González Sellán" userId="2f8bc1f2c7576c9e" providerId="LiveId" clId="{9D7F36AE-F77C-4854-81C3-2D749D1ACCF4}" dt="2019-10-20T15:12:36.862" v="31" actId="478"/>
-          <ac:spMkLst>
-            <pc:docMk/>
-            <pc:sldMk cId="4138071570" sldId="266"/>
-            <ac:spMk id="7" creationId="{ADDA00C0-A06C-4BC7-B43C-CAA85A1EC793}"/>
-          </ac:spMkLst>
-        </pc:spChg>
-        <pc:spChg chg="del">
-          <ac:chgData name="Daniel González Sellán" userId="2f8bc1f2c7576c9e" providerId="LiveId" clId="{9D7F36AE-F77C-4854-81C3-2D749D1ACCF4}" dt="2019-10-20T15:12:37.807" v="33" actId="478"/>
-          <ac:spMkLst>
-            <pc:docMk/>
-            <pc:sldMk cId="4138071570" sldId="266"/>
-            <ac:spMk id="8" creationId="{570F1D0A-3E6B-47D0-BEA1-84D0BFAF05D0}"/>
-          </ac:spMkLst>
-        </pc:spChg>
-        <pc:spChg chg="del">
-          <ac:chgData name="Daniel González Sellán" userId="2f8bc1f2c7576c9e" providerId="LiveId" clId="{9D7F36AE-F77C-4854-81C3-2D749D1ACCF4}" dt="2019-10-20T15:12:34.849" v="28" actId="478"/>
-          <ac:spMkLst>
-            <pc:docMk/>
-            <pc:sldMk cId="4138071570" sldId="266"/>
-            <ac:spMk id="9" creationId="{F8386B12-16E8-4A92-A16B-795E64C58B0D}"/>
-          </ac:spMkLst>
-        </pc:spChg>
-        <pc:spChg chg="del">
-          <ac:chgData name="Daniel González Sellán" userId="2f8bc1f2c7576c9e" providerId="LiveId" clId="{9D7F36AE-F77C-4854-81C3-2D749D1ACCF4}" dt="2019-10-20T15:12:36.314" v="30" actId="478"/>
-          <ac:spMkLst>
-            <pc:docMk/>
-            <pc:sldMk cId="4138071570" sldId="266"/>
-            <ac:spMk id="10" creationId="{9423E789-CF1A-4D78-8FC6-E9347B97CE60}"/>
-          </ac:spMkLst>
-        </pc:spChg>
-        <pc:spChg chg="del">
-          <ac:chgData name="Daniel González Sellán" userId="2f8bc1f2c7576c9e" providerId="LiveId" clId="{9D7F36AE-F77C-4854-81C3-2D749D1ACCF4}" dt="2019-10-20T15:12:37.332" v="32" actId="478"/>
-          <ac:spMkLst>
-            <pc:docMk/>
-            <pc:sldMk cId="4138071570" sldId="266"/>
-            <ac:spMk id="12" creationId="{4A140842-9A71-4F74-90E1-A5F8DD0D9EC9}"/>
-          </ac:spMkLst>
-        </pc:spChg>
-        <pc:spChg chg="del">
-          <ac:chgData name="Daniel González Sellán" userId="2f8bc1f2c7576c9e" providerId="LiveId" clId="{9D7F36AE-F77C-4854-81C3-2D749D1ACCF4}" dt="2019-10-20T15:12:38.150" v="34" actId="478"/>
-          <ac:spMkLst>
-            <pc:docMk/>
-            <pc:sldMk cId="4138071570" sldId="266"/>
-            <ac:spMk id="13" creationId="{288D7E17-2FD0-4CB5-8FC4-EFC0165740F4}"/>
-          </ac:spMkLst>
-        </pc:spChg>
-        <pc:spChg chg="del">
-          <ac:chgData name="Daniel González Sellán" userId="2f8bc1f2c7576c9e" providerId="LiveId" clId="{9D7F36AE-F77C-4854-81C3-2D749D1ACCF4}" dt="2019-10-20T15:12:38.825" v="35" actId="478"/>
-          <ac:spMkLst>
-            <pc:docMk/>
-            <pc:sldMk cId="4138071570" sldId="266"/>
-            <ac:spMk id="14" creationId="{8F8810EE-B93A-4A9E-A1A0-DE95C334F478}"/>
-          </ac:spMkLst>
-        </pc:spChg>
-        <pc:spChg chg="add mod">
-          <ac:chgData name="Daniel González Sellán" userId="2f8bc1f2c7576c9e" providerId="LiveId" clId="{9D7F36AE-F77C-4854-81C3-2D749D1ACCF4}" dt="2019-10-20T15:12:43.072" v="39" actId="1076"/>
-          <ac:spMkLst>
-            <pc:docMk/>
-            <pc:sldMk cId="4138071570" sldId="266"/>
-            <ac:spMk id="16" creationId="{320A3129-3B36-4095-81FA-CAD7E013D5AD}"/>
-          </ac:spMkLst>
-        </pc:spChg>
-        <pc:spChg chg="add">
-          <ac:chgData name="Daniel González Sellán" userId="2f8bc1f2c7576c9e" providerId="LiveId" clId="{9D7F36AE-F77C-4854-81C3-2D749D1ACCF4}" dt="2019-10-20T15:12:41.756" v="38"/>
-          <ac:spMkLst>
-            <pc:docMk/>
-            <pc:sldMk cId="4138071570" sldId="266"/>
-            <ac:spMk id="17" creationId="{8EAA1143-CABB-48B4-9AE5-A795C6DFD786}"/>
-          </ac:spMkLst>
-        </pc:spChg>
-        <pc:spChg chg="add mod">
-          <ac:chgData name="Daniel González Sellán" userId="2f8bc1f2c7576c9e" providerId="LiveId" clId="{9D7F36AE-F77C-4854-81C3-2D749D1ACCF4}" dt="2019-10-20T15:13:10.814" v="54" actId="1076"/>
-          <ac:spMkLst>
-            <pc:docMk/>
-            <pc:sldMk cId="4138071570" sldId="266"/>
-            <ac:spMk id="18" creationId="{46DC781D-F4B8-4221-BD8C-19779A21A1EC}"/>
-          </ac:spMkLst>
-        </pc:spChg>
-        <pc:spChg chg="add mod">
-          <ac:chgData name="Daniel González Sellán" userId="2f8bc1f2c7576c9e" providerId="LiveId" clId="{9D7F36AE-F77C-4854-81C3-2D749D1ACCF4}" dt="2019-10-20T15:12:50.572" v="45" actId="1076"/>
-          <ac:spMkLst>
-            <pc:docMk/>
-            <pc:sldMk cId="4138071570" sldId="266"/>
-            <ac:spMk id="19" creationId="{745D3D86-8EF1-4D91-BE82-4E9DE802164A}"/>
-          </ac:spMkLst>
-        </pc:spChg>
-        <pc:spChg chg="add mod">
-          <ac:chgData name="Daniel González Sellán" userId="2f8bc1f2c7576c9e" providerId="LiveId" clId="{9D7F36AE-F77C-4854-81C3-2D749D1ACCF4}" dt="2019-10-20T15:12:53.661" v="46" actId="1076"/>
-          <ac:spMkLst>
-            <pc:docMk/>
-            <pc:sldMk cId="4138071570" sldId="266"/>
-            <ac:spMk id="20" creationId="{A654227D-B6C0-4970-B4A9-9D44397F7E9C}"/>
-          </ac:spMkLst>
-        </pc:spChg>
-        <pc:spChg chg="add mod">
-          <ac:chgData name="Daniel González Sellán" userId="2f8bc1f2c7576c9e" providerId="LiveId" clId="{9D7F36AE-F77C-4854-81C3-2D749D1ACCF4}" dt="2019-10-20T15:12:56.318" v="48" actId="1076"/>
-          <ac:spMkLst>
-            <pc:docMk/>
-            <pc:sldMk cId="4138071570" sldId="266"/>
-            <ac:spMk id="21" creationId="{0B752AC1-0F30-4A43-AD9F-4E17CB70780E}"/>
-          </ac:spMkLst>
-        </pc:spChg>
-        <pc:spChg chg="add mod">
-          <ac:chgData name="Daniel González Sellán" userId="2f8bc1f2c7576c9e" providerId="LiveId" clId="{9D7F36AE-F77C-4854-81C3-2D749D1ACCF4}" dt="2019-10-20T15:13:00.596" v="50" actId="1076"/>
-          <ac:spMkLst>
-            <pc:docMk/>
-            <pc:sldMk cId="4138071570" sldId="266"/>
-            <ac:spMk id="22" creationId="{43635878-5DBE-4E69-9B79-F9A8A2369754}"/>
-          </ac:spMkLst>
-        </pc:spChg>
-        <pc:spChg chg="add mod">
-          <ac:chgData name="Daniel González Sellán" userId="2f8bc1f2c7576c9e" providerId="LiveId" clId="{9D7F36AE-F77C-4854-81C3-2D749D1ACCF4}" dt="2019-10-20T15:13:07.478" v="53" actId="1076"/>
-          <ac:spMkLst>
-            <pc:docMk/>
-            <pc:sldMk cId="4138071570" sldId="266"/>
-            <ac:spMk id="23" creationId="{151D02C2-37BA-4592-A52D-F43D8B93D77C}"/>
-          </ac:spMkLst>
-        </pc:spChg>
-      </pc:sldChg>
-      <pc:sldChg chg="add del">
-        <pc:chgData name="Daniel González Sellán" userId="2f8bc1f2c7576c9e" providerId="LiveId" clId="{9D7F36AE-F77C-4854-81C3-2D749D1ACCF4}" dt="2019-10-20T15:34:35.948" v="59" actId="2696"/>
-        <pc:sldMkLst>
-          <pc:docMk/>
-          <pc:sldMk cId="4223873161" sldId="267"/>
-        </pc:sldMkLst>
-      </pc:sldChg>
-      <pc:sldChg chg="addSp delSp modSp add ord setBg">
-        <pc:chgData name="Daniel González Sellán" userId="2f8bc1f2c7576c9e" providerId="LiveId" clId="{9D7F36AE-F77C-4854-81C3-2D749D1ACCF4}" dt="2019-10-20T15:47:32.580" v="543" actId="403"/>
-        <pc:sldMkLst>
-          <pc:docMk/>
-          <pc:sldMk cId="2519377478" sldId="268"/>
-        </pc:sldMkLst>
-        <pc:spChg chg="mod">
-          <ac:chgData name="Daniel González Sellán" userId="2f8bc1f2c7576c9e" providerId="LiveId" clId="{9D7F36AE-F77C-4854-81C3-2D749D1ACCF4}" dt="2019-10-20T15:47:32.580" v="543" actId="403"/>
-          <ac:spMkLst>
-            <pc:docMk/>
-            <pc:sldMk cId="2519377478" sldId="268"/>
-            <ac:spMk id="2" creationId="{4A1E4228-1475-49A0-BF73-265211E19663}"/>
-          </ac:spMkLst>
-        </pc:spChg>
-        <pc:spChg chg="add del mod">
-          <ac:chgData name="Daniel González Sellán" userId="2f8bc1f2c7576c9e" providerId="LiveId" clId="{9D7F36AE-F77C-4854-81C3-2D749D1ACCF4}" dt="2019-10-20T15:34:46.446" v="71" actId="478"/>
-          <ac:spMkLst>
-            <pc:docMk/>
-            <pc:sldMk cId="2519377478" sldId="268"/>
-            <ac:spMk id="4" creationId="{35CE83C4-6799-4F74-A465-FB32F149B530}"/>
-          </ac:spMkLst>
-        </pc:spChg>
-        <pc:spChg chg="add mod">
-          <ac:chgData name="Daniel González Sellán" userId="2f8bc1f2c7576c9e" providerId="LiveId" clId="{9D7F36AE-F77C-4854-81C3-2D749D1ACCF4}" dt="2019-10-20T15:39:23.590" v="298" actId="1076"/>
-          <ac:spMkLst>
-            <pc:docMk/>
-            <pc:sldMk cId="2519377478" sldId="268"/>
-            <ac:spMk id="6" creationId="{354756FE-8C2F-401D-AC5D-77A61FE9467C}"/>
-          </ac:spMkLst>
-        </pc:spChg>
-        <pc:spChg chg="mod">
-          <ac:chgData name="Daniel González Sellán" userId="2f8bc1f2c7576c9e" providerId="LiveId" clId="{9D7F36AE-F77C-4854-81C3-2D749D1ACCF4}" dt="2019-10-20T15:39:23.590" v="298" actId="1076"/>
-          <ac:spMkLst>
-            <pc:docMk/>
-            <pc:sldMk cId="2519377478" sldId="268"/>
-            <ac:spMk id="10" creationId="{E92ED792-C406-4260-A9C4-E58E91924A68}"/>
-          </ac:spMkLst>
-        </pc:spChg>
-        <pc:spChg chg="mod">
-          <ac:chgData name="Daniel González Sellán" userId="2f8bc1f2c7576c9e" providerId="LiveId" clId="{9D7F36AE-F77C-4854-81C3-2D749D1ACCF4}" dt="2019-10-20T15:39:23.590" v="298" actId="1076"/>
-          <ac:spMkLst>
-            <pc:docMk/>
-            <pc:sldMk cId="2519377478" sldId="268"/>
-            <ac:spMk id="11" creationId="{A439EDAD-0498-4133-8BCD-688E514A4711}"/>
-          </ac:spMkLst>
-        </pc:spChg>
-        <pc:spChg chg="mod">
-          <ac:chgData name="Daniel González Sellán" userId="2f8bc1f2c7576c9e" providerId="LiveId" clId="{9D7F36AE-F77C-4854-81C3-2D749D1ACCF4}" dt="2019-10-20T15:39:23.590" v="298" actId="1076"/>
-          <ac:spMkLst>
-            <pc:docMk/>
-            <pc:sldMk cId="2519377478" sldId="268"/>
-            <ac:spMk id="12" creationId="{DDD095A5-4772-423A-9EEA-03554CAF1A0A}"/>
-          </ac:spMkLst>
-        </pc:spChg>
-        <pc:spChg chg="add mod">
-          <ac:chgData name="Daniel González Sellán" userId="2f8bc1f2c7576c9e" providerId="LiveId" clId="{9D7F36AE-F77C-4854-81C3-2D749D1ACCF4}" dt="2019-10-20T15:39:23.590" v="298" actId="1076"/>
-          <ac:spMkLst>
-            <pc:docMk/>
-            <pc:sldMk cId="2519377478" sldId="268"/>
-            <ac:spMk id="13" creationId="{F67BFA94-C529-482D-AD8B-EFF7A2C90C7E}"/>
-          </ac:spMkLst>
-        </pc:spChg>
-        <pc:spChg chg="add mod">
-          <ac:chgData name="Daniel González Sellán" userId="2f8bc1f2c7576c9e" providerId="LiveId" clId="{9D7F36AE-F77C-4854-81C3-2D749D1ACCF4}" dt="2019-10-20T15:39:23.590" v="298" actId="1076"/>
-          <ac:spMkLst>
-            <pc:docMk/>
-            <pc:sldMk cId="2519377478" sldId="268"/>
-            <ac:spMk id="14" creationId="{BE27A0E4-6D1A-4C00-9A3E-710263CDECF2}"/>
-          </ac:spMkLst>
-        </pc:spChg>
-        <pc:picChg chg="del">
-          <ac:chgData name="Daniel González Sellán" userId="2f8bc1f2c7576c9e" providerId="LiveId" clId="{9D7F36AE-F77C-4854-81C3-2D749D1ACCF4}" dt="2019-10-20T15:34:44.926" v="70" actId="478"/>
-          <ac:picMkLst>
-            <pc:docMk/>
-            <pc:sldMk cId="2519377478" sldId="268"/>
-            <ac:picMk id="5" creationId="{96626986-7110-41FA-ACB9-ACD55D9A71D2}"/>
-          </ac:picMkLst>
-        </pc:picChg>
-        <pc:picChg chg="del">
-          <ac:chgData name="Daniel González Sellán" userId="2f8bc1f2c7576c9e" providerId="LiveId" clId="{9D7F36AE-F77C-4854-81C3-2D749D1ACCF4}" dt="2019-10-20T15:34:44.068" v="68" actId="478"/>
-          <ac:picMkLst>
-            <pc:docMk/>
-            <pc:sldMk cId="2519377478" sldId="268"/>
-            <ac:picMk id="7" creationId="{85E9ED5B-6588-4F1C-97E0-E9FFD0619A9E}"/>
-          </ac:picMkLst>
-        </pc:picChg>
-        <pc:picChg chg="del">
-          <ac:chgData name="Daniel González Sellán" userId="2f8bc1f2c7576c9e" providerId="LiveId" clId="{9D7F36AE-F77C-4854-81C3-2D749D1ACCF4}" dt="2019-10-20T15:34:44.533" v="69" actId="478"/>
-          <ac:picMkLst>
-            <pc:docMk/>
-            <pc:sldMk cId="2519377478" sldId="268"/>
-            <ac:picMk id="9" creationId="{03864E2D-1B04-4035-85B0-02EFE47616AA}"/>
-          </ac:picMkLst>
-        </pc:picChg>
-        <pc:picChg chg="add mod">
-          <ac:chgData name="Daniel González Sellán" userId="2f8bc1f2c7576c9e" providerId="LiveId" clId="{9D7F36AE-F77C-4854-81C3-2D749D1ACCF4}" dt="2019-10-20T15:39:29.945" v="299" actId="1076"/>
-          <ac:picMkLst>
-            <pc:docMk/>
-            <pc:sldMk cId="2519377478" sldId="268"/>
-            <ac:picMk id="15" creationId="{FFE2BEF8-2C9F-44FD-BB45-478CAAF840E6}"/>
-          </ac:picMkLst>
-        </pc:picChg>
-      </pc:sldChg>
-      <pc:sldChg chg="addSp delSp modSp add mod setBg setClrOvrMap">
-        <pc:chgData name="Daniel González Sellán" userId="2f8bc1f2c7576c9e" providerId="LiveId" clId="{9D7F36AE-F77C-4854-81C3-2D749D1ACCF4}" dt="2019-10-20T15:40:56.856" v="339" actId="26606"/>
-        <pc:sldMkLst>
-          <pc:docMk/>
-          <pc:sldMk cId="2011190902" sldId="269"/>
-        </pc:sldMkLst>
-        <pc:spChg chg="mod ord">
-          <ac:chgData name="Daniel González Sellán" userId="2f8bc1f2c7576c9e" providerId="LiveId" clId="{9D7F36AE-F77C-4854-81C3-2D749D1ACCF4}" dt="2019-10-20T15:40:56.856" v="339" actId="26606"/>
-          <ac:spMkLst>
-            <pc:docMk/>
-            <pc:sldMk cId="2011190902" sldId="269"/>
-            <ac:spMk id="2" creationId="{0E33FAF3-3790-494D-94AF-9539FBC75C8E}"/>
-          </ac:spMkLst>
-        </pc:spChg>
-        <pc:spChg chg="del">
-          <ac:chgData name="Daniel González Sellán" userId="2f8bc1f2c7576c9e" providerId="LiveId" clId="{9D7F36AE-F77C-4854-81C3-2D749D1ACCF4}" dt="2019-10-20T15:40:19.181" v="301" actId="478"/>
-          <ac:spMkLst>
-            <pc:docMk/>
-            <pc:sldMk cId="2011190902" sldId="269"/>
-            <ac:spMk id="3" creationId="{3AA853BD-7198-4C32-8861-E976A3BC438B}"/>
-          </ac:spMkLst>
-        </pc:spChg>
-        <pc:spChg chg="add">
-          <ac:chgData name="Daniel González Sellán" userId="2f8bc1f2c7576c9e" providerId="LiveId" clId="{9D7F36AE-F77C-4854-81C3-2D749D1ACCF4}" dt="2019-10-20T15:40:56.856" v="339" actId="26606"/>
-          <ac:spMkLst>
-            <pc:docMk/>
-            <pc:sldMk cId="2011190902" sldId="269"/>
-            <ac:spMk id="10" creationId="{71B2258F-86CA-4D4D-8270-BC05FCDEBFB3}"/>
-          </ac:spMkLst>
-        </pc:spChg>
-        <pc:picChg chg="add mod">
-          <ac:chgData name="Daniel González Sellán" userId="2f8bc1f2c7576c9e" providerId="LiveId" clId="{9D7F36AE-F77C-4854-81C3-2D749D1ACCF4}" dt="2019-10-20T15:40:56.856" v="339" actId="26606"/>
-          <ac:picMkLst>
-            <pc:docMk/>
-            <pc:sldMk cId="2011190902" sldId="269"/>
-            <ac:picMk id="5" creationId="{49780082-99EC-4906-887A-C8A21CB4869E}"/>
-          </ac:picMkLst>
-        </pc:picChg>
-      </pc:sldChg>
-      <pc:sldChg chg="addSp delSp modSp add mod setBg setClrOvrMap">
-        <pc:chgData name="Daniel González Sellán" userId="2f8bc1f2c7576c9e" providerId="LiveId" clId="{9D7F36AE-F77C-4854-81C3-2D749D1ACCF4}" dt="2019-10-20T15:42:08.849" v="387" actId="26606"/>
-        <pc:sldMkLst>
-          <pc:docMk/>
-          <pc:sldMk cId="546110393" sldId="270"/>
-        </pc:sldMkLst>
-        <pc:spChg chg="mod ord">
-          <ac:chgData name="Daniel González Sellán" userId="2f8bc1f2c7576c9e" providerId="LiveId" clId="{9D7F36AE-F77C-4854-81C3-2D749D1ACCF4}" dt="2019-10-20T15:42:08.849" v="387" actId="26606"/>
-          <ac:spMkLst>
-            <pc:docMk/>
-            <pc:sldMk cId="546110393" sldId="270"/>
-            <ac:spMk id="2" creationId="{F2650BAB-8F17-4FD0-9FD9-3CE31498267C}"/>
-          </ac:spMkLst>
-        </pc:spChg>
-        <pc:spChg chg="del">
-          <ac:chgData name="Daniel González Sellán" userId="2f8bc1f2c7576c9e" providerId="LiveId" clId="{9D7F36AE-F77C-4854-81C3-2D749D1ACCF4}" dt="2019-10-20T15:41:09.604" v="341" actId="478"/>
-          <ac:spMkLst>
-            <pc:docMk/>
-            <pc:sldMk cId="546110393" sldId="270"/>
-            <ac:spMk id="3" creationId="{95E63241-E2C4-4335-AF55-21F2A7B5D487}"/>
-          </ac:spMkLst>
-        </pc:spChg>
-        <pc:spChg chg="add">
-          <ac:chgData name="Daniel González Sellán" userId="2f8bc1f2c7576c9e" providerId="LiveId" clId="{9D7F36AE-F77C-4854-81C3-2D749D1ACCF4}" dt="2019-10-20T15:42:08.849" v="387" actId="26606"/>
-          <ac:spMkLst>
-            <pc:docMk/>
-            <pc:sldMk cId="546110393" sldId="270"/>
-            <ac:spMk id="10" creationId="{71B2258F-86CA-4D4D-8270-BC05FCDEBFB3}"/>
-          </ac:spMkLst>
-        </pc:spChg>
-        <pc:picChg chg="add mod">
-          <ac:chgData name="Daniel González Sellán" userId="2f8bc1f2c7576c9e" providerId="LiveId" clId="{9D7F36AE-F77C-4854-81C3-2D749D1ACCF4}" dt="2019-10-20T15:42:08.849" v="387" actId="26606"/>
-          <ac:picMkLst>
-            <pc:docMk/>
-            <pc:sldMk cId="546110393" sldId="270"/>
-            <ac:picMk id="5" creationId="{332D2FB1-CA52-43D2-A42F-D317EEB24697}"/>
-          </ac:picMkLst>
-        </pc:picChg>
-      </pc:sldChg>
-      <pc:sldChg chg="addSp delSp modSp add mod setBg">
-        <pc:chgData name="Daniel González Sellán" userId="2f8bc1f2c7576c9e" providerId="LiveId" clId="{9D7F36AE-F77C-4854-81C3-2D749D1ACCF4}" dt="2019-10-20T15:44:53.459" v="475" actId="1076"/>
-        <pc:sldMkLst>
-          <pc:docMk/>
-          <pc:sldMk cId="4124795748" sldId="271"/>
-        </pc:sldMkLst>
-        <pc:spChg chg="mod">
-          <ac:chgData name="Daniel González Sellán" userId="2f8bc1f2c7576c9e" providerId="LiveId" clId="{9D7F36AE-F77C-4854-81C3-2D749D1ACCF4}" dt="2019-10-20T15:43:23.233" v="417" actId="26606"/>
-          <ac:spMkLst>
-            <pc:docMk/>
-            <pc:sldMk cId="4124795748" sldId="271"/>
-            <ac:spMk id="2" creationId="{BE11A7EF-B36B-4B4C-81F9-ACFAAFCA6037}"/>
-          </ac:spMkLst>
-        </pc:spChg>
-        <pc:spChg chg="del">
-          <ac:chgData name="Daniel González Sellán" userId="2f8bc1f2c7576c9e" providerId="LiveId" clId="{9D7F36AE-F77C-4854-81C3-2D749D1ACCF4}" dt="2019-10-20T15:42:27.831" v="408" actId="478"/>
-          <ac:spMkLst>
-            <pc:docMk/>
-            <pc:sldMk cId="4124795748" sldId="271"/>
-            <ac:spMk id="3" creationId="{29D845D3-C9D7-4D1E-A3C1-3EBA35D39E2A}"/>
-          </ac:spMkLst>
-        </pc:spChg>
-        <pc:spChg chg="add mod">
-          <ac:chgData name="Daniel González Sellán" userId="2f8bc1f2c7576c9e" providerId="LiveId" clId="{9D7F36AE-F77C-4854-81C3-2D749D1ACCF4}" dt="2019-10-20T15:44:53.459" v="475" actId="1076"/>
-          <ac:spMkLst>
-            <pc:docMk/>
-            <pc:sldMk cId="4124795748" sldId="271"/>
-            <ac:spMk id="8" creationId="{CBE0FD73-79F2-4494-98E5-0B726322BC49}"/>
-          </ac:spMkLst>
-        </pc:spChg>
-        <pc:spChg chg="add mod">
-          <ac:chgData name="Daniel González Sellán" userId="2f8bc1f2c7576c9e" providerId="LiveId" clId="{9D7F36AE-F77C-4854-81C3-2D749D1ACCF4}" dt="2019-10-20T15:44:46.361" v="474" actId="1076"/>
-          <ac:spMkLst>
-            <pc:docMk/>
-            <pc:sldMk cId="4124795748" sldId="271"/>
-            <ac:spMk id="13" creationId="{0FE65E20-BB2D-4664-84B1-C4623E87419B}"/>
-          </ac:spMkLst>
-        </pc:spChg>
-        <pc:spChg chg="add">
-          <ac:chgData name="Daniel González Sellán" userId="2f8bc1f2c7576c9e" providerId="LiveId" clId="{9D7F36AE-F77C-4854-81C3-2D749D1ACCF4}" dt="2019-10-20T15:43:23.233" v="417" actId="26606"/>
-          <ac:spMkLst>
-            <pc:docMk/>
-            <pc:sldMk cId="4124795748" sldId="271"/>
-            <ac:spMk id="14" creationId="{823AC064-BC96-4F32-8AE1-B2FD38754823}"/>
-          </ac:spMkLst>
-        </pc:spChg>
-        <pc:picChg chg="add mod">
-          <ac:chgData name="Daniel González Sellán" userId="2f8bc1f2c7576c9e" providerId="LiveId" clId="{9D7F36AE-F77C-4854-81C3-2D749D1ACCF4}" dt="2019-10-20T15:44:53.459" v="475" actId="1076"/>
-          <ac:picMkLst>
-            <pc:docMk/>
-            <pc:sldMk cId="4124795748" sldId="271"/>
-            <ac:picMk id="5" creationId="{10F682B5-DCEE-4216-8C1C-FCA5E7C8201B}"/>
-          </ac:picMkLst>
-        </pc:picChg>
-        <pc:picChg chg="add mod">
-          <ac:chgData name="Daniel González Sellán" userId="2f8bc1f2c7576c9e" providerId="LiveId" clId="{9D7F36AE-F77C-4854-81C3-2D749D1ACCF4}" dt="2019-10-20T15:44:46.361" v="474" actId="1076"/>
-          <ac:picMkLst>
-            <pc:docMk/>
-            <pc:sldMk cId="4124795748" sldId="271"/>
-            <ac:picMk id="7" creationId="{968BC0CC-6BD8-4F88-9959-E852F649C241}"/>
-          </ac:picMkLst>
-        </pc:picChg>
-        <pc:cxnChg chg="add">
-          <ac:chgData name="Daniel González Sellán" userId="2f8bc1f2c7576c9e" providerId="LiveId" clId="{9D7F36AE-F77C-4854-81C3-2D749D1ACCF4}" dt="2019-10-20T15:43:23.233" v="417" actId="26606"/>
-          <ac:cxnSpMkLst>
-            <pc:docMk/>
-            <pc:sldMk cId="4124795748" sldId="271"/>
-            <ac:cxnSpMk id="12" creationId="{DB146403-F3D6-484B-B2ED-97F9565D0370}"/>
-          </ac:cxnSpMkLst>
-        </pc:cxnChg>
-        <pc:cxnChg chg="add">
-          <ac:chgData name="Daniel González Sellán" userId="2f8bc1f2c7576c9e" providerId="LiveId" clId="{9D7F36AE-F77C-4854-81C3-2D749D1ACCF4}" dt="2019-10-20T15:43:23.233" v="417" actId="26606"/>
-          <ac:cxnSpMkLst>
-            <pc:docMk/>
-            <pc:sldMk cId="4124795748" sldId="271"/>
-            <ac:cxnSpMk id="16" creationId="{7E7C77BC-7138-40B1-A15B-20F57A494629}"/>
-          </ac:cxnSpMkLst>
-        </pc:cxnChg>
-      </pc:sldChg>
-      <pc:sldChg chg="delSp add del setBg delDesignElem">
-        <pc:chgData name="Daniel González Sellán" userId="2f8bc1f2c7576c9e" providerId="LiveId" clId="{9D7F36AE-F77C-4854-81C3-2D749D1ACCF4}" dt="2019-10-20T15:44:25.632" v="456" actId="2696"/>
-        <pc:sldMkLst>
-          <pc:docMk/>
-          <pc:sldMk cId="1482371013" sldId="272"/>
-        </pc:sldMkLst>
-        <pc:spChg chg="del">
-          <ac:chgData name="Daniel González Sellán" userId="2f8bc1f2c7576c9e" providerId="LiveId" clId="{9D7F36AE-F77C-4854-81C3-2D749D1ACCF4}" dt="2019-10-20T15:44:13.895" v="454"/>
-          <ac:spMkLst>
-            <pc:docMk/>
-            <pc:sldMk cId="1482371013" sldId="272"/>
-            <ac:spMk id="14" creationId="{823AC064-BC96-4F32-8AE1-B2FD38754823}"/>
-          </ac:spMkLst>
-        </pc:spChg>
-        <pc:cxnChg chg="del">
-          <ac:chgData name="Daniel González Sellán" userId="2f8bc1f2c7576c9e" providerId="LiveId" clId="{9D7F36AE-F77C-4854-81C3-2D749D1ACCF4}" dt="2019-10-20T15:44:13.895" v="454"/>
-          <ac:cxnSpMkLst>
-            <pc:docMk/>
-            <pc:sldMk cId="1482371013" sldId="272"/>
-            <ac:cxnSpMk id="12" creationId="{DB146403-F3D6-484B-B2ED-97F9565D0370}"/>
-          </ac:cxnSpMkLst>
-        </pc:cxnChg>
-        <pc:cxnChg chg="del">
-          <ac:chgData name="Daniel González Sellán" userId="2f8bc1f2c7576c9e" providerId="LiveId" clId="{9D7F36AE-F77C-4854-81C3-2D749D1ACCF4}" dt="2019-10-20T15:44:13.895" v="454"/>
-          <ac:cxnSpMkLst>
-            <pc:docMk/>
-            <pc:sldMk cId="1482371013" sldId="272"/>
-            <ac:cxnSpMk id="16" creationId="{7E7C77BC-7138-40B1-A15B-20F57A494629}"/>
-          </ac:cxnSpMkLst>
-        </pc:cxnChg>
-      </pc:sldChg>
-      <pc:sldChg chg="delSp add del setBg delDesignElem">
-        <pc:chgData name="Daniel González Sellán" userId="2f8bc1f2c7576c9e" providerId="LiveId" clId="{9D7F36AE-F77C-4854-81C3-2D749D1ACCF4}" dt="2019-10-20T15:44:12.742" v="452" actId="2696"/>
-        <pc:sldMkLst>
-          <pc:docMk/>
-          <pc:sldMk cId="1765143276" sldId="272"/>
-        </pc:sldMkLst>
-        <pc:spChg chg="del">
-          <ac:chgData name="Daniel González Sellán" userId="2f8bc1f2c7576c9e" providerId="LiveId" clId="{9D7F36AE-F77C-4854-81C3-2D749D1ACCF4}" dt="2019-10-20T15:43:25.025" v="419"/>
-          <ac:spMkLst>
-            <pc:docMk/>
-            <pc:sldMk cId="1765143276" sldId="272"/>
-            <ac:spMk id="14" creationId="{823AC064-BC96-4F32-8AE1-B2FD38754823}"/>
-          </ac:spMkLst>
-        </pc:spChg>
-        <pc:cxnChg chg="del">
-          <ac:chgData name="Daniel González Sellán" userId="2f8bc1f2c7576c9e" providerId="LiveId" clId="{9D7F36AE-F77C-4854-81C3-2D749D1ACCF4}" dt="2019-10-20T15:43:25.025" v="419"/>
-          <ac:cxnSpMkLst>
-            <pc:docMk/>
-            <pc:sldMk cId="1765143276" sldId="272"/>
-            <ac:cxnSpMk id="12" creationId="{DB146403-F3D6-484B-B2ED-97F9565D0370}"/>
-          </ac:cxnSpMkLst>
-        </pc:cxnChg>
-        <pc:cxnChg chg="del">
-          <ac:chgData name="Daniel González Sellán" userId="2f8bc1f2c7576c9e" providerId="LiveId" clId="{9D7F36AE-F77C-4854-81C3-2D749D1ACCF4}" dt="2019-10-20T15:43:25.025" v="419"/>
-          <ac:cxnSpMkLst>
-            <pc:docMk/>
-            <pc:sldMk cId="1765143276" sldId="272"/>
-            <ac:cxnSpMk id="16" creationId="{7E7C77BC-7138-40B1-A15B-20F57A494629}"/>
-          </ac:cxnSpMkLst>
-        </pc:cxnChg>
-      </pc:sldChg>
-      <pc:sldChg chg="addSp delSp modSp add">
-        <pc:chgData name="Daniel González Sellán" userId="2f8bc1f2c7576c9e" providerId="LiveId" clId="{9D7F36AE-F77C-4854-81C3-2D749D1ACCF4}" dt="2019-10-20T15:46:29.801" v="531" actId="478"/>
-        <pc:sldMkLst>
-          <pc:docMk/>
-          <pc:sldMk cId="1873206143" sldId="272"/>
-        </pc:sldMkLst>
-        <pc:spChg chg="mod">
-          <ac:chgData name="Daniel González Sellán" userId="2f8bc1f2c7576c9e" providerId="LiveId" clId="{9D7F36AE-F77C-4854-81C3-2D749D1ACCF4}" dt="2019-10-20T15:45:02.536" v="487" actId="20577"/>
-          <ac:spMkLst>
-            <pc:docMk/>
-            <pc:sldMk cId="1873206143" sldId="272"/>
-            <ac:spMk id="2" creationId="{BE11A7EF-B36B-4B4C-81F9-ACFAAFCA6037}"/>
-          </ac:spMkLst>
-        </pc:spChg>
-        <pc:spChg chg="mod">
-          <ac:chgData name="Daniel González Sellán" userId="2f8bc1f2c7576c9e" providerId="LiveId" clId="{9D7F36AE-F77C-4854-81C3-2D749D1ACCF4}" dt="2019-10-20T15:45:59.122" v="526" actId="20577"/>
-          <ac:spMkLst>
-            <pc:docMk/>
-            <pc:sldMk cId="1873206143" sldId="272"/>
-            <ac:spMk id="8" creationId="{CBE0FD73-79F2-4494-98E5-0B726322BC49}"/>
-          </ac:spMkLst>
-        </pc:spChg>
-        <pc:spChg chg="mod">
-          <ac:chgData name="Daniel González Sellán" userId="2f8bc1f2c7576c9e" providerId="LiveId" clId="{9D7F36AE-F77C-4854-81C3-2D749D1ACCF4}" dt="2019-10-20T15:45:12.845" v="499" actId="20577"/>
-          <ac:spMkLst>
-            <pc:docMk/>
-            <pc:sldMk cId="1873206143" sldId="272"/>
-            <ac:spMk id="13" creationId="{0FE65E20-BB2D-4664-84B1-C4623E87419B}"/>
-          </ac:spMkLst>
-        </pc:spChg>
-        <pc:picChg chg="add mod ord">
-          <ac:chgData name="Daniel González Sellán" userId="2f8bc1f2c7576c9e" providerId="LiveId" clId="{9D7F36AE-F77C-4854-81C3-2D749D1ACCF4}" dt="2019-10-20T15:45:50.855" v="508" actId="167"/>
-          <ac:picMkLst>
-            <pc:docMk/>
-            <pc:sldMk cId="1873206143" sldId="272"/>
-            <ac:picMk id="4" creationId="{33445CD3-A0E5-4FD3-97FB-F578BAF9053D}"/>
-          </ac:picMkLst>
-        </pc:picChg>
-        <pc:picChg chg="del">
-          <ac:chgData name="Daniel González Sellán" userId="2f8bc1f2c7576c9e" providerId="LiveId" clId="{9D7F36AE-F77C-4854-81C3-2D749D1ACCF4}" dt="2019-10-20T15:46:29.801" v="531" actId="478"/>
-          <ac:picMkLst>
-            <pc:docMk/>
-            <pc:sldMk cId="1873206143" sldId="272"/>
-            <ac:picMk id="5" creationId="{10F682B5-DCEE-4216-8C1C-FCA5E7C8201B}"/>
-          </ac:picMkLst>
-        </pc:picChg>
-        <pc:picChg chg="add del">
-          <ac:chgData name="Daniel González Sellán" userId="2f8bc1f2c7576c9e" providerId="LiveId" clId="{9D7F36AE-F77C-4854-81C3-2D749D1ACCF4}" dt="2019-10-20T15:45:51.842" v="509" actId="478"/>
-          <ac:picMkLst>
-            <pc:docMk/>
-            <pc:sldMk cId="1873206143" sldId="272"/>
-            <ac:picMk id="7" creationId="{968BC0CC-6BD8-4F88-9959-E852F649C241}"/>
-          </ac:picMkLst>
-        </pc:picChg>
-        <pc:picChg chg="add mod ord">
-          <ac:chgData name="Daniel González Sellán" userId="2f8bc1f2c7576c9e" providerId="LiveId" clId="{9D7F36AE-F77C-4854-81C3-2D749D1ACCF4}" dt="2019-10-20T15:46:28.886" v="530" actId="167"/>
-          <ac:picMkLst>
-            <pc:docMk/>
-            <pc:sldMk cId="1873206143" sldId="272"/>
-            <ac:picMk id="9" creationId="{974640F3-AAEE-4A7F-B714-3BB1C26D0356}"/>
-          </ac:picMkLst>
-        </pc:picChg>
-      </pc:sldChg>
-      <pc:sldChg chg="modSp add del">
-        <pc:chgData name="Daniel González Sellán" userId="2f8bc1f2c7576c9e" providerId="LiveId" clId="{9D7F36AE-F77C-4854-81C3-2D749D1ACCF4}" dt="2019-10-20T15:44:55.214" v="476" actId="2696"/>
-        <pc:sldMkLst>
-          <pc:docMk/>
-          <pc:sldMk cId="4104635679" sldId="273"/>
-        </pc:sldMkLst>
-        <pc:spChg chg="mod">
-          <ac:chgData name="Daniel González Sellán" userId="2f8bc1f2c7576c9e" providerId="LiveId" clId="{9D7F36AE-F77C-4854-81C3-2D749D1ACCF4}" dt="2019-10-20T15:44:32.543" v="472" actId="20577"/>
-          <ac:spMkLst>
-            <pc:docMk/>
-            <pc:sldMk cId="4104635679" sldId="273"/>
-            <ac:spMk id="2" creationId="{BE11A7EF-B36B-4B4C-81F9-ACFAAFCA6037}"/>
-          </ac:spMkLst>
-        </pc:spChg>
-      </pc:sldChg>
-    </pc:docChg>
-  </pc:docChgLst>
-</pc:chgInfo>
-</file>
-
 <file path=ppt/slideLayouts/slideLayout1.xml><?xml version="1.0" encoding="utf-8"?>
 <p:sldLayout xmlns:a="http://schemas.openxmlformats.org/drawingml/2006/main" xmlns:r="http://schemas.openxmlformats.org/officeDocument/2006/relationships" xmlns:p="http://schemas.openxmlformats.org/presentationml/2006/main" type="title" preserve="1">
   <p:cSld name="Title Slide">
@@ -978,7 +274,7 @@
           <a:p>
             <a:fld id="{34886847-9952-4A28-88D9-8279A383A541}" type="datetimeFigureOut">
               <a:rPr lang="en-US" smtClean="0"/>
-              <a:t>20-Oct-19</a:t>
+              <a:t>22-Oct-19</a:t>
             </a:fld>
             <a:endParaRPr lang="en-US"/>
           </a:p>
@@ -1176,7 +472,7 @@
           <a:p>
             <a:fld id="{34886847-9952-4A28-88D9-8279A383A541}" type="datetimeFigureOut">
               <a:rPr lang="en-US" smtClean="0"/>
-              <a:t>20-Oct-19</a:t>
+              <a:t>22-Oct-19</a:t>
             </a:fld>
             <a:endParaRPr lang="en-US"/>
           </a:p>
@@ -1384,7 +680,7 @@
           <a:p>
             <a:fld id="{34886847-9952-4A28-88D9-8279A383A541}" type="datetimeFigureOut">
               <a:rPr lang="en-US" smtClean="0"/>
-              <a:t>20-Oct-19</a:t>
+              <a:t>22-Oct-19</a:t>
             </a:fld>
             <a:endParaRPr lang="en-US"/>
           </a:p>
@@ -1582,7 +878,7 @@
           <a:p>
             <a:fld id="{34886847-9952-4A28-88D9-8279A383A541}" type="datetimeFigureOut">
               <a:rPr lang="en-US" smtClean="0"/>
-              <a:t>20-Oct-19</a:t>
+              <a:t>22-Oct-19</a:t>
             </a:fld>
             <a:endParaRPr lang="en-US"/>
           </a:p>
@@ -1857,7 +1153,7 @@
           <a:p>
             <a:fld id="{34886847-9952-4A28-88D9-8279A383A541}" type="datetimeFigureOut">
               <a:rPr lang="en-US" smtClean="0"/>
-              <a:t>20-Oct-19</a:t>
+              <a:t>22-Oct-19</a:t>
             </a:fld>
             <a:endParaRPr lang="en-US"/>
           </a:p>
@@ -2122,7 +1418,7 @@
           <a:p>
             <a:fld id="{34886847-9952-4A28-88D9-8279A383A541}" type="datetimeFigureOut">
               <a:rPr lang="en-US" smtClean="0"/>
-              <a:t>20-Oct-19</a:t>
+              <a:t>22-Oct-19</a:t>
             </a:fld>
             <a:endParaRPr lang="en-US"/>
           </a:p>
@@ -2534,7 +1830,7 @@
           <a:p>
             <a:fld id="{34886847-9952-4A28-88D9-8279A383A541}" type="datetimeFigureOut">
               <a:rPr lang="en-US" smtClean="0"/>
-              <a:t>20-Oct-19</a:t>
+              <a:t>22-Oct-19</a:t>
             </a:fld>
             <a:endParaRPr lang="en-US"/>
           </a:p>
@@ -2675,7 +1971,7 @@
           <a:p>
             <a:fld id="{34886847-9952-4A28-88D9-8279A383A541}" type="datetimeFigureOut">
               <a:rPr lang="en-US" smtClean="0"/>
-              <a:t>20-Oct-19</a:t>
+              <a:t>22-Oct-19</a:t>
             </a:fld>
             <a:endParaRPr lang="en-US"/>
           </a:p>
@@ -2788,7 +2084,7 @@
           <a:p>
             <a:fld id="{34886847-9952-4A28-88D9-8279A383A541}" type="datetimeFigureOut">
               <a:rPr lang="en-US" smtClean="0"/>
-              <a:t>20-Oct-19</a:t>
+              <a:t>22-Oct-19</a:t>
             </a:fld>
             <a:endParaRPr lang="en-US"/>
           </a:p>
@@ -3099,7 +2395,7 @@
           <a:p>
             <a:fld id="{34886847-9952-4A28-88D9-8279A383A541}" type="datetimeFigureOut">
               <a:rPr lang="en-US" smtClean="0"/>
-              <a:t>20-Oct-19</a:t>
+              <a:t>22-Oct-19</a:t>
             </a:fld>
             <a:endParaRPr lang="en-US"/>
           </a:p>
@@ -3387,7 +2683,7 @@
           <a:p>
             <a:fld id="{34886847-9952-4A28-88D9-8279A383A541}" type="datetimeFigureOut">
               <a:rPr lang="en-US" smtClean="0"/>
-              <a:t>20-Oct-19</a:t>
+              <a:t>22-Oct-19</a:t>
             </a:fld>
             <a:endParaRPr lang="en-US"/>
           </a:p>
@@ -3628,7 +2924,7 @@
           <a:p>
             <a:fld id="{34886847-9952-4A28-88D9-8279A383A541}" type="datetimeFigureOut">
               <a:rPr lang="en-US" smtClean="0"/>
-              <a:t>20-Oct-19</a:t>
+              <a:t>22-Oct-19</a:t>
             </a:fld>
             <a:endParaRPr lang="en-US"/>
           </a:p>
@@ -4216,10 +3512,10 @@
           <a:lstStyle/>
           <a:p>
             <a:r>
-              <a:rPr lang="es-ES" sz="5800"/>
+              <a:rPr lang="es-ES" sz="5800" dirty="0"/>
               <a:t>TRIBES</a:t>
             </a:r>
-            <a:endParaRPr lang="en-US" sz="5800"/>
+            <a:endParaRPr lang="en-US" sz="5800" dirty="0"/>
           </a:p>
         </p:txBody>
       </p:sp>
@@ -4277,6 +3573,50 @@
           </a:fontRef>
         </p:style>
       </p:cxnSp>
+      <p:sp>
+        <p:nvSpPr>
+          <p:cNvPr id="3" name="TextBox 2">
+            <a:extLst>
+              <a:ext uri="{FF2B5EF4-FFF2-40B4-BE49-F238E27FC236}">
+                <a16:creationId xmlns:a16="http://schemas.microsoft.com/office/drawing/2014/main" id="{E354ED08-AC8A-4D6B-AB67-90820563B0AE}"/>
+              </a:ext>
+            </a:extLst>
+          </p:cNvPr>
+          <p:cNvSpPr txBox="1"/>
+          <p:nvPr/>
+        </p:nvSpPr>
+        <p:spPr>
+          <a:xfrm>
+            <a:off x="4724400" y="4206327"/>
+            <a:ext cx="2743200" cy="646331"/>
+          </a:xfrm>
+          <a:prstGeom prst="rect">
+            <a:avLst/>
+          </a:prstGeom>
+          <a:noFill/>
+        </p:spPr>
+        <p:txBody>
+          <a:bodyPr wrap="square" rtlCol="0">
+            <a:spAutoFit/>
+          </a:bodyPr>
+          <a:lstStyle/>
+          <a:p>
+            <a:pPr algn="ctr"/>
+            <a:r>
+              <a:rPr lang="es-ES" dirty="0"/>
+              <a:t>Pablo Villapún</a:t>
+            </a:r>
+          </a:p>
+          <a:p>
+            <a:pPr algn="ctr"/>
+            <a:r>
+              <a:rPr lang="es-ES" dirty="0"/>
+              <a:t>Daniel G. Sellán</a:t>
+            </a:r>
+            <a:endParaRPr lang="en-US" dirty="0"/>
+          </a:p>
+        </p:txBody>
+      </p:sp>
     </p:spTree>
     <p:extLst>
       <p:ext uri="{BB962C8B-B14F-4D97-AF65-F5344CB8AC3E}">
@@ -6071,7 +5411,7 @@
           </p:cNvPicPr>
           <p:nvPr/>
         </p:nvPicPr>
-        <p:blipFill>
+        <p:blipFill rotWithShape="1">
           <a:blip r:embed="rId2">
             <a:extLst>
               <a:ext uri="{28A0092B-C50C-407E-A947-70E740481C1C}">
@@ -6079,14 +5419,13 @@
               </a:ext>
             </a:extLst>
           </a:blip>
-          <a:stretch>
-            <a:fillRect/>
-          </a:stretch>
+          <a:srcRect b="10718"/>
+          <a:stretch/>
         </p:blipFill>
         <p:spPr>
           <a:xfrm>
             <a:off x="6434701" y="313454"/>
-            <a:ext cx="5455909" cy="3646170"/>
+            <a:ext cx="5455909" cy="3580982"/>
           </a:xfrm>
           <a:prstGeom prst="rect">
             <a:avLst/>
@@ -6432,6 +5771,286 @@
   </p:cSld>
   <p:clrMapOvr>
     <a:masterClrMapping/>
+  </p:clrMapOvr>
+</p:sld>
+</file>
+
+<file path=ppt/slides/slide16.xml><?xml version="1.0" encoding="utf-8"?>
+<p:sld xmlns:a="http://schemas.openxmlformats.org/drawingml/2006/main" xmlns:r="http://schemas.openxmlformats.org/officeDocument/2006/relationships" xmlns:p="http://schemas.openxmlformats.org/presentationml/2006/main">
+  <p:cSld>
+    <p:bg>
+      <p:bgPr>
+        <a:solidFill>
+          <a:schemeClr val="tx1"/>
+        </a:solidFill>
+        <a:effectLst/>
+      </p:bgPr>
+    </p:bg>
+    <p:spTree>
+      <p:nvGrpSpPr>
+        <p:cNvPr id="1" name=""/>
+        <p:cNvGrpSpPr/>
+        <p:nvPr/>
+      </p:nvGrpSpPr>
+      <p:grpSpPr>
+        <a:xfrm>
+          <a:off x="0" y="0"/>
+          <a:ext cx="0" cy="0"/>
+          <a:chOff x="0" y="0"/>
+          <a:chExt cx="0" cy="0"/>
+        </a:xfrm>
+      </p:grpSpPr>
+      <p:sp>
+        <p:nvSpPr>
+          <p:cNvPr id="7" name="Rectangle 6">
+            <a:extLst>
+              <a:ext uri="{FF2B5EF4-FFF2-40B4-BE49-F238E27FC236}">
+                <a16:creationId xmlns:a16="http://schemas.microsoft.com/office/drawing/2014/main" id="{2A8AA5BC-4F7A-4226-8F99-6D824B226A97}"/>
+              </a:ext>
+              <a:ext uri="{C183D7F6-B498-43B3-948B-1728B52AA6E4}">
+                <adec:decorative xmlns:adec="http://schemas.microsoft.com/office/drawing/2017/decorative" val="1"/>
+              </a:ext>
+            </a:extLst>
+          </p:cNvPr>
+          <p:cNvSpPr>
+            <a:spLocks noGrp="1" noRot="1" noChangeAspect="1" noMove="1" noResize="1" noEditPoints="1" noAdjustHandles="1" noChangeArrowheads="1" noChangeShapeType="1" noTextEdit="1"/>
+          </p:cNvSpPr>
+          <p:nvPr>
+            <p:extLst>
+              <p:ext uri="{386F3935-93C4-4BCD-93E2-E3B085C9AB24}">
+                <p16:designElem xmlns:p16="http://schemas.microsoft.com/office/powerpoint/2015/main" val="1"/>
+              </p:ext>
+            </p:extLst>
+          </p:nvPr>
+        </p:nvSpPr>
+        <p:spPr>
+          <a:xfrm>
+            <a:off x="0" y="-3324"/>
+            <a:ext cx="12192000" cy="6861324"/>
+          </a:xfrm>
+          <a:prstGeom prst="rect">
+            <a:avLst/>
+          </a:prstGeom>
+          <a:solidFill>
+            <a:schemeClr val="tx1"/>
+          </a:solidFill>
+          <a:ln>
+            <a:noFill/>
+          </a:ln>
+        </p:spPr>
+        <p:style>
+          <a:lnRef idx="2">
+            <a:schemeClr val="accent1">
+              <a:shade val="50000"/>
+            </a:schemeClr>
+          </a:lnRef>
+          <a:fillRef idx="1">
+            <a:schemeClr val="accent1"/>
+          </a:fillRef>
+          <a:effectRef idx="0">
+            <a:schemeClr val="accent1"/>
+          </a:effectRef>
+          <a:fontRef idx="minor">
+            <a:schemeClr val="lt1"/>
+          </a:fontRef>
+        </p:style>
+        <p:txBody>
+          <a:bodyPr rtlCol="0" anchor="ctr"/>
+          <a:lstStyle/>
+          <a:p>
+            <a:pPr algn="ctr"/>
+            <a:endParaRPr lang="en-US"/>
+          </a:p>
+        </p:txBody>
+      </p:sp>
+      <p:sp>
+        <p:nvSpPr>
+          <p:cNvPr id="9" name="Rectangle 8">
+            <a:extLst>
+              <a:ext uri="{FF2B5EF4-FFF2-40B4-BE49-F238E27FC236}">
+                <a16:creationId xmlns:a16="http://schemas.microsoft.com/office/drawing/2014/main" id="{3E5445C6-DD42-4979-86FF-03730E8C6DB0}"/>
+              </a:ext>
+              <a:ext uri="{C183D7F6-B498-43B3-948B-1728B52AA6E4}">
+                <adec:decorative xmlns:adec="http://schemas.microsoft.com/office/drawing/2017/decorative" val="1"/>
+              </a:ext>
+            </a:extLst>
+          </p:cNvPr>
+          <p:cNvSpPr>
+            <a:spLocks noGrp="1" noRot="1" noChangeAspect="1" noMove="1" noResize="1" noEditPoints="1" noAdjustHandles="1" noChangeArrowheads="1" noChangeShapeType="1" noTextEdit="1"/>
+          </p:cNvSpPr>
+          <p:nvPr>
+            <p:extLst>
+              <p:ext uri="{386F3935-93C4-4BCD-93E2-E3B085C9AB24}">
+                <p16:designElem xmlns:p16="http://schemas.microsoft.com/office/powerpoint/2015/main" val="1"/>
+              </p:ext>
+            </p:extLst>
+          </p:nvPr>
+        </p:nvSpPr>
+        <p:spPr bwMode="ltGray">
+          <a:xfrm>
+            <a:off x="321734" y="321733"/>
+            <a:ext cx="11573488" cy="6214534"/>
+          </a:xfrm>
+          <a:prstGeom prst="rect">
+            <a:avLst/>
+          </a:prstGeom>
+          <a:solidFill>
+            <a:schemeClr val="bg1">
+              <a:lumMod val="75000"/>
+              <a:lumOff val="25000"/>
+            </a:schemeClr>
+          </a:solidFill>
+          <a:ln w="127000" cap="sq" cmpd="thinThick">
+            <a:solidFill>
+              <a:schemeClr val="bg1">
+                <a:lumMod val="75000"/>
+                <a:lumOff val="25000"/>
+              </a:schemeClr>
+            </a:solidFill>
+          </a:ln>
+        </p:spPr>
+        <p:style>
+          <a:lnRef idx="2">
+            <a:schemeClr val="accent1">
+              <a:shade val="50000"/>
+            </a:schemeClr>
+          </a:lnRef>
+          <a:fillRef idx="1">
+            <a:schemeClr val="accent1"/>
+          </a:fillRef>
+          <a:effectRef idx="0">
+            <a:schemeClr val="accent1"/>
+          </a:effectRef>
+          <a:fontRef idx="minor">
+            <a:schemeClr val="lt1"/>
+          </a:fontRef>
+        </p:style>
+        <p:txBody>
+          <a:bodyPr rtlCol="0" anchor="ctr"/>
+          <a:lstStyle/>
+          <a:p>
+            <a:pPr algn="ctr"/>
+            <a:endParaRPr lang="en-US"/>
+          </a:p>
+        </p:txBody>
+      </p:sp>
+      <p:sp>
+        <p:nvSpPr>
+          <p:cNvPr id="2" name="Title 1">
+            <a:extLst>
+              <a:ext uri="{FF2B5EF4-FFF2-40B4-BE49-F238E27FC236}">
+                <a16:creationId xmlns:a16="http://schemas.microsoft.com/office/drawing/2014/main" id="{F003E4BC-E347-46F2-9ED8-4E3A2F654F75}"/>
+              </a:ext>
+            </a:extLst>
+          </p:cNvPr>
+          <p:cNvSpPr>
+            <a:spLocks noGrp="1"/>
+          </p:cNvSpPr>
+          <p:nvPr>
+            <p:ph type="title"/>
+          </p:nvPr>
+        </p:nvSpPr>
+        <p:spPr>
+          <a:xfrm>
+            <a:off x="1524000" y="1122362"/>
+            <a:ext cx="9144000" cy="2840037"/>
+          </a:xfrm>
+        </p:spPr>
+        <p:txBody>
+          <a:bodyPr vert="horz" lIns="91440" tIns="45720" rIns="91440" bIns="45720" rtlCol="0" anchor="b">
+            <a:normAutofit/>
+          </a:bodyPr>
+          <a:lstStyle/>
+          <a:p>
+            <a:pPr algn="ctr"/>
+            <a:r>
+              <a:rPr lang="en-US" sz="5800" kern="1200" dirty="0" err="1">
+                <a:solidFill>
+                  <a:schemeClr val="tx1"/>
+                </a:solidFill>
+                <a:latin typeface="+mj-lt"/>
+                <a:ea typeface="+mj-ea"/>
+                <a:cs typeface="+mj-cs"/>
+              </a:rPr>
+              <a:t>Muchas</a:t>
+            </a:r>
+            <a:r>
+              <a:rPr lang="en-US" sz="5800" kern="1200" dirty="0">
+                <a:solidFill>
+                  <a:schemeClr val="tx1"/>
+                </a:solidFill>
+                <a:latin typeface="+mj-lt"/>
+                <a:ea typeface="+mj-ea"/>
+                <a:cs typeface="+mj-cs"/>
+              </a:rPr>
+              <a:t> gracias</a:t>
+            </a:r>
+          </a:p>
+        </p:txBody>
+      </p:sp>
+      <p:cxnSp>
+        <p:nvCxnSpPr>
+          <p:cNvPr id="11" name="Straight Connector 10">
+            <a:extLst>
+              <a:ext uri="{FF2B5EF4-FFF2-40B4-BE49-F238E27FC236}">
+                <a16:creationId xmlns:a16="http://schemas.microsoft.com/office/drawing/2014/main" id="{45000665-DFC7-417E-8FD7-516A0F15C975}"/>
+              </a:ext>
+              <a:ext uri="{C183D7F6-B498-43B3-948B-1728B52AA6E4}">
+                <adec:decorative xmlns:adec="http://schemas.microsoft.com/office/drawing/2017/decorative" val="1"/>
+              </a:ext>
+            </a:extLst>
+          </p:cNvPr>
+          <p:cNvCxnSpPr>
+            <a:cxnSpLocks noGrp="1" noRot="1" noChangeAspect="1" noMove="1" noResize="1" noEditPoints="1" noAdjustHandles="1" noChangeArrowheads="1" noChangeShapeType="1"/>
+          </p:cNvCxnSpPr>
+          <p:nvPr>
+            <p:extLst>
+              <p:ext uri="{386F3935-93C4-4BCD-93E2-E3B085C9AB24}">
+                <p16:designElem xmlns:p16="http://schemas.microsoft.com/office/powerpoint/2015/main" val="1"/>
+              </p:ext>
+            </p:extLst>
+          </p:nvPr>
+        </p:nvCxnSpPr>
+        <p:spPr>
+          <a:xfrm>
+            <a:off x="4724400" y="4109417"/>
+            <a:ext cx="2743200" cy="0"/>
+          </a:xfrm>
+          <a:prstGeom prst="line">
+            <a:avLst/>
+          </a:prstGeom>
+          <a:ln w="12700">
+            <a:solidFill>
+              <a:schemeClr val="tx1">
+                <a:lumMod val="85000"/>
+              </a:schemeClr>
+            </a:solidFill>
+          </a:ln>
+        </p:spPr>
+        <p:style>
+          <a:lnRef idx="1">
+            <a:schemeClr val="accent1"/>
+          </a:lnRef>
+          <a:fillRef idx="0">
+            <a:schemeClr val="accent1"/>
+          </a:fillRef>
+          <a:effectRef idx="0">
+            <a:schemeClr val="accent1"/>
+          </a:effectRef>
+          <a:fontRef idx="minor">
+            <a:schemeClr val="tx1"/>
+          </a:fontRef>
+        </p:style>
+      </p:cxnSp>
+    </p:spTree>
+    <p:extLst>
+      <p:ext uri="{BB962C8B-B14F-4D97-AF65-F5344CB8AC3E}">
+        <p14:creationId xmlns:p14="http://schemas.microsoft.com/office/powerpoint/2010/main" val="400197872"/>
+      </p:ext>
+    </p:extLst>
+  </p:cSld>
+  <p:clrMapOvr>
+    <a:overrideClrMapping bg1="dk1" tx1="lt1" bg2="dk2" tx2="lt2" accent1="accent1" accent2="accent2" accent3="accent3" accent4="accent4" accent5="accent5" accent6="accent6" hlink="hlink" folHlink="folHlink"/>
   </p:clrMapOvr>
 </p:sld>
 </file>

</xml_diff>